<commit_message>
Kwäschtschen 2 completed!! Ready for Kwäschtschen 3!!!
</commit_message>
<xml_diff>
--- a/Recap_06.10.17.pptx
+++ b/Recap_06.10.17.pptx
@@ -120,6 +120,10 @@
 </p:presentation>
 </file>
 
+<file path=ppt/revisionInfo.xml><?xml version="1.0" encoding="utf-8"?>
+<p1510:revInfo xmlns:a="http://schemas.openxmlformats.org/drawingml/2006/main" xmlns:r="http://schemas.openxmlformats.org/officeDocument/2006/relationships" xmlns:p1510="http://schemas.microsoft.com/office/powerpoint/2015/10/main"/>
+</file>
+
 <file path=ppt/slideLayouts/slideLayout1.xml><?xml version="1.0" encoding="utf-8"?>
 <p:sldLayout xmlns:a="http://schemas.openxmlformats.org/drawingml/2006/main" xmlns:r="http://schemas.openxmlformats.org/officeDocument/2006/relationships" xmlns:p="http://schemas.openxmlformats.org/presentationml/2006/main" showMasterSp="0" type="title" preserve="1">
   <p:cSld name="Titelfolie">
@@ -170,7 +174,7 @@
           <a:noFill/>
           <a:extLst>
             <a:ext uri="{909E8E84-426E-40dd-AFC4-6F175D3DCCD1}">
-              <a14:hiddenFill xmlns="" xmlns:a14="http://schemas.microsoft.com/office/drawing/2010/main">
+              <a14:hiddenFill xmlns:a14="http://schemas.microsoft.com/office/drawing/2010/main" xmlns="">
                 <a:solidFill>
                   <a:srgbClr val="FFFFFF"/>
                 </a:solidFill>
@@ -230,7 +234,7 @@
             </a:ln>
             <a:extLst>
               <a:ext uri="{91240B29-F687-4f45-9708-019B960494DF}">
-                <a14:hiddenLine xmlns="" xmlns:a14="http://schemas.microsoft.com/office/drawing/2010/main" w="9525">
+                <a14:hiddenLine xmlns:a14="http://schemas.microsoft.com/office/drawing/2010/main" xmlns="" w="9525">
                   <a:solidFill>
                     <a:srgbClr val="000000"/>
                   </a:solidFill>
@@ -320,7 +324,7 @@
             </a:ln>
             <a:extLst>
               <a:ext uri="{91240B29-F687-4f45-9708-019B960494DF}">
-                <a14:hiddenLine xmlns="" xmlns:a14="http://schemas.microsoft.com/office/drawing/2010/main" w="9525">
+                <a14:hiddenLine xmlns:a14="http://schemas.microsoft.com/office/drawing/2010/main" xmlns="" w="9525">
                   <a:solidFill>
                     <a:srgbClr val="000000"/>
                   </a:solidFill>
@@ -410,7 +414,7 @@
             </a:ln>
             <a:extLst>
               <a:ext uri="{91240B29-F687-4f45-9708-019B960494DF}">
-                <a14:hiddenLine xmlns="" xmlns:a14="http://schemas.microsoft.com/office/drawing/2010/main" w="9525">
+                <a14:hiddenLine xmlns:a14="http://schemas.microsoft.com/office/drawing/2010/main" xmlns="" w="9525">
                   <a:solidFill>
                     <a:srgbClr val="000000"/>
                   </a:solidFill>
@@ -444,7 +448,7 @@
             </a:ln>
             <a:extLst>
               <a:ext uri="{91240B29-F687-4f45-9708-019B960494DF}">
-                <a14:hiddenLine xmlns="" xmlns:a14="http://schemas.microsoft.com/office/drawing/2010/main" w="9525">
+                <a14:hiddenLine xmlns:a14="http://schemas.microsoft.com/office/drawing/2010/main" xmlns="" w="9525">
                   <a:solidFill>
                     <a:srgbClr val="000000"/>
                   </a:solidFill>
@@ -534,7 +538,7 @@
             </a:ln>
             <a:extLst>
               <a:ext uri="{91240B29-F687-4f45-9708-019B960494DF}">
-                <a14:hiddenLine xmlns="" xmlns:a14="http://schemas.microsoft.com/office/drawing/2010/main" w="9525">
+                <a14:hiddenLine xmlns:a14="http://schemas.microsoft.com/office/drawing/2010/main" xmlns="" w="9525">
                   <a:solidFill>
                     <a:srgbClr val="000000"/>
                   </a:solidFill>
@@ -596,7 +600,7 @@
             </a:ln>
             <a:extLst>
               <a:ext uri="{91240B29-F687-4f45-9708-019B960494DF}">
-                <a14:hiddenLine xmlns="" xmlns:a14="http://schemas.microsoft.com/office/drawing/2010/main" w="9525">
+                <a14:hiddenLine xmlns:a14="http://schemas.microsoft.com/office/drawing/2010/main" xmlns="" w="9525">
                   <a:solidFill>
                     <a:srgbClr val="000000"/>
                   </a:solidFill>
@@ -658,7 +662,7 @@
             </a:ln>
             <a:extLst>
               <a:ext uri="{91240B29-F687-4f45-9708-019B960494DF}">
-                <a14:hiddenLine xmlns="" xmlns:a14="http://schemas.microsoft.com/office/drawing/2010/main" w="9525">
+                <a14:hiddenLine xmlns:a14="http://schemas.microsoft.com/office/drawing/2010/main" xmlns="" w="9525">
                   <a:solidFill>
                     <a:srgbClr val="000000"/>
                   </a:solidFill>
@@ -748,7 +752,7 @@
             </a:ln>
             <a:extLst>
               <a:ext uri="{91240B29-F687-4f45-9708-019B960494DF}">
-                <a14:hiddenLine xmlns="" xmlns:a14="http://schemas.microsoft.com/office/drawing/2010/main" w="9525">
+                <a14:hiddenLine xmlns:a14="http://schemas.microsoft.com/office/drawing/2010/main" xmlns="" w="9525">
                   <a:solidFill>
                     <a:srgbClr val="000000"/>
                   </a:solidFill>
@@ -810,7 +814,7 @@
             </a:ln>
             <a:extLst>
               <a:ext uri="{91240B29-F687-4f45-9708-019B960494DF}">
-                <a14:hiddenLine xmlns="" xmlns:a14="http://schemas.microsoft.com/office/drawing/2010/main" w="9525">
+                <a14:hiddenLine xmlns:a14="http://schemas.microsoft.com/office/drawing/2010/main" xmlns="" w="9525">
                   <a:solidFill>
                     <a:srgbClr val="000000"/>
                   </a:solidFill>
@@ -872,7 +876,7 @@
             </a:ln>
             <a:extLst>
               <a:ext uri="{91240B29-F687-4f45-9708-019B960494DF}">
-                <a14:hiddenLine xmlns="" xmlns:a14="http://schemas.microsoft.com/office/drawing/2010/main" w="9525">
+                <a14:hiddenLine xmlns:a14="http://schemas.microsoft.com/office/drawing/2010/main" xmlns="" w="9525">
                   <a:solidFill>
                     <a:srgbClr val="000000"/>
                   </a:solidFill>
@@ -962,7 +966,7 @@
             </a:ln>
             <a:extLst>
               <a:ext uri="{91240B29-F687-4f45-9708-019B960494DF}">
-                <a14:hiddenLine xmlns="" xmlns:a14="http://schemas.microsoft.com/office/drawing/2010/main" w="9525">
+                <a14:hiddenLine xmlns:a14="http://schemas.microsoft.com/office/drawing/2010/main" xmlns="" w="9525">
                   <a:solidFill>
                     <a:srgbClr val="000000"/>
                   </a:solidFill>
@@ -1052,7 +1056,7 @@
             </a:ln>
             <a:extLst>
               <a:ext uri="{91240B29-F687-4f45-9708-019B960494DF}">
-                <a14:hiddenLine xmlns="" xmlns:a14="http://schemas.microsoft.com/office/drawing/2010/main" w="9525">
+                <a14:hiddenLine xmlns:a14="http://schemas.microsoft.com/office/drawing/2010/main" xmlns="" w="9525">
                   <a:solidFill>
                     <a:srgbClr val="000000"/>
                   </a:solidFill>
@@ -1114,7 +1118,7 @@
             </a:ln>
             <a:extLst>
               <a:ext uri="{91240B29-F687-4f45-9708-019B960494DF}">
-                <a14:hiddenLine xmlns="" xmlns:a14="http://schemas.microsoft.com/office/drawing/2010/main" w="9525">
+                <a14:hiddenLine xmlns:a14="http://schemas.microsoft.com/office/drawing/2010/main" xmlns="" w="9525">
                   <a:solidFill>
                     <a:srgbClr val="000000"/>
                   </a:solidFill>
@@ -1224,7 +1228,7 @@
             </a:ln>
             <a:extLst>
               <a:ext uri="{91240B29-F687-4f45-9708-019B960494DF}">
-                <a14:hiddenLine xmlns="" xmlns:a14="http://schemas.microsoft.com/office/drawing/2010/main" w="9525">
+                <a14:hiddenLine xmlns:a14="http://schemas.microsoft.com/office/drawing/2010/main" xmlns="" w="9525">
                   <a:solidFill>
                     <a:srgbClr val="000000"/>
                   </a:solidFill>
@@ -1286,7 +1290,7 @@
             </a:ln>
             <a:extLst>
               <a:ext uri="{91240B29-F687-4f45-9708-019B960494DF}">
-                <a14:hiddenLine xmlns="" xmlns:a14="http://schemas.microsoft.com/office/drawing/2010/main" w="9525">
+                <a14:hiddenLine xmlns:a14="http://schemas.microsoft.com/office/drawing/2010/main" xmlns="" w="9525">
                   <a:solidFill>
                     <a:srgbClr val="000000"/>
                   </a:solidFill>
@@ -1376,7 +1380,7 @@
             </a:ln>
             <a:extLst>
               <a:ext uri="{91240B29-F687-4f45-9708-019B960494DF}">
-                <a14:hiddenLine xmlns="" xmlns:a14="http://schemas.microsoft.com/office/drawing/2010/main" w="9525">
+                <a14:hiddenLine xmlns:a14="http://schemas.microsoft.com/office/drawing/2010/main" xmlns="" w="9525">
                   <a:solidFill>
                     <a:srgbClr val="000000"/>
                   </a:solidFill>
@@ -1466,7 +1470,7 @@
             </a:ln>
             <a:extLst>
               <a:ext uri="{91240B29-F687-4f45-9708-019B960494DF}">
-                <a14:hiddenLine xmlns="" xmlns:a14="http://schemas.microsoft.com/office/drawing/2010/main" w="9525">
+                <a14:hiddenLine xmlns:a14="http://schemas.microsoft.com/office/drawing/2010/main" xmlns="" w="9525">
                   <a:solidFill>
                     <a:srgbClr val="000000"/>
                   </a:solidFill>
@@ -1528,7 +1532,7 @@
             </a:ln>
             <a:extLst>
               <a:ext uri="{91240B29-F687-4f45-9708-019B960494DF}">
-                <a14:hiddenLine xmlns="" xmlns:a14="http://schemas.microsoft.com/office/drawing/2010/main" w="9525">
+                <a14:hiddenLine xmlns:a14="http://schemas.microsoft.com/office/drawing/2010/main" xmlns="" w="9525">
                   <a:solidFill>
                     <a:srgbClr val="000000"/>
                   </a:solidFill>
@@ -1618,7 +1622,7 @@
             </a:ln>
             <a:extLst>
               <a:ext uri="{91240B29-F687-4f45-9708-019B960494DF}">
-                <a14:hiddenLine xmlns="" xmlns:a14="http://schemas.microsoft.com/office/drawing/2010/main" w="9525">
+                <a14:hiddenLine xmlns:a14="http://schemas.microsoft.com/office/drawing/2010/main" xmlns="" w="9525">
                   <a:solidFill>
                     <a:srgbClr val="000000"/>
                   </a:solidFill>
@@ -1708,7 +1712,7 @@
             </a:ln>
             <a:extLst>
               <a:ext uri="{91240B29-F687-4f45-9708-019B960494DF}">
-                <a14:hiddenLine xmlns="" xmlns:a14="http://schemas.microsoft.com/office/drawing/2010/main" w="9525">
+                <a14:hiddenLine xmlns:a14="http://schemas.microsoft.com/office/drawing/2010/main" xmlns="" w="9525">
                   <a:solidFill>
                     <a:srgbClr val="000000"/>
                   </a:solidFill>
@@ -1764,7 +1768,7 @@
             </a:ln>
             <a:extLst>
               <a:ext uri="{91240B29-F687-4f45-9708-019B960494DF}">
-                <a14:hiddenLine xmlns="" xmlns:a14="http://schemas.microsoft.com/office/drawing/2010/main" w="9525">
+                <a14:hiddenLine xmlns:a14="http://schemas.microsoft.com/office/drawing/2010/main" xmlns="" w="9525">
                   <a:solidFill>
                     <a:srgbClr val="000000"/>
                   </a:solidFill>
@@ -1854,7 +1858,7 @@
             </a:ln>
             <a:extLst>
               <a:ext uri="{91240B29-F687-4f45-9708-019B960494DF}">
-                <a14:hiddenLine xmlns="" xmlns:a14="http://schemas.microsoft.com/office/drawing/2010/main" w="9525">
+                <a14:hiddenLine xmlns:a14="http://schemas.microsoft.com/office/drawing/2010/main" xmlns="" w="9525">
                   <a:solidFill>
                     <a:srgbClr val="000000"/>
                   </a:solidFill>
@@ -1910,7 +1914,7 @@
             </a:ln>
             <a:extLst>
               <a:ext uri="{91240B29-F687-4f45-9708-019B960494DF}">
-                <a14:hiddenLine xmlns="" xmlns:a14="http://schemas.microsoft.com/office/drawing/2010/main" w="9525">
+                <a14:hiddenLine xmlns:a14="http://schemas.microsoft.com/office/drawing/2010/main" xmlns="" w="9525">
                   <a:solidFill>
                     <a:srgbClr val="000000"/>
                   </a:solidFill>
@@ -2000,7 +2004,7 @@
             </a:ln>
             <a:extLst>
               <a:ext uri="{91240B29-F687-4f45-9708-019B960494DF}">
-                <a14:hiddenLine xmlns="" xmlns:a14="http://schemas.microsoft.com/office/drawing/2010/main" w="9525">
+                <a14:hiddenLine xmlns:a14="http://schemas.microsoft.com/office/drawing/2010/main" xmlns="" w="9525">
                   <a:solidFill>
                     <a:srgbClr val="000000"/>
                   </a:solidFill>
@@ -2068,7 +2072,7 @@
             </a:ln>
             <a:extLst>
               <a:ext uri="{91240B29-F687-4f45-9708-019B960494DF}">
-                <a14:hiddenLine xmlns="" xmlns:a14="http://schemas.microsoft.com/office/drawing/2010/main" w="9525">
+                <a14:hiddenLine xmlns:a14="http://schemas.microsoft.com/office/drawing/2010/main" xmlns="" w="9525">
                   <a:solidFill>
                     <a:srgbClr val="000000"/>
                   </a:solidFill>
@@ -2158,7 +2162,7 @@
             </a:ln>
             <a:extLst>
               <a:ext uri="{91240B29-F687-4f45-9708-019B960494DF}">
-                <a14:hiddenLine xmlns="" xmlns:a14="http://schemas.microsoft.com/office/drawing/2010/main" w="9525">
+                <a14:hiddenLine xmlns:a14="http://schemas.microsoft.com/office/drawing/2010/main" xmlns="" w="9525">
                   <a:solidFill>
                     <a:srgbClr val="000000"/>
                   </a:solidFill>
@@ -2226,7 +2230,7 @@
             </a:ln>
             <a:extLst>
               <a:ext uri="{91240B29-F687-4f45-9708-019B960494DF}">
-                <a14:hiddenLine xmlns="" xmlns:a14="http://schemas.microsoft.com/office/drawing/2010/main" w="9525">
+                <a14:hiddenLine xmlns:a14="http://schemas.microsoft.com/office/drawing/2010/main" xmlns="" w="9525">
                   <a:solidFill>
                     <a:srgbClr val="000000"/>
                   </a:solidFill>
@@ -2316,7 +2320,7 @@
             </a:ln>
             <a:extLst>
               <a:ext uri="{91240B29-F687-4f45-9708-019B960494DF}">
-                <a14:hiddenLine xmlns="" xmlns:a14="http://schemas.microsoft.com/office/drawing/2010/main" w="9525">
+                <a14:hiddenLine xmlns:a14="http://schemas.microsoft.com/office/drawing/2010/main" xmlns="" w="9525">
                   <a:solidFill>
                     <a:srgbClr val="000000"/>
                   </a:solidFill>
@@ -2350,7 +2354,7 @@
             </a:ln>
             <a:extLst>
               <a:ext uri="{91240B29-F687-4f45-9708-019B960494DF}">
-                <a14:hiddenLine xmlns="" xmlns:a14="http://schemas.microsoft.com/office/drawing/2010/main" w="9525">
+                <a14:hiddenLine xmlns:a14="http://schemas.microsoft.com/office/drawing/2010/main" xmlns="" w="9525">
                   <a:solidFill>
                     <a:srgbClr val="000000"/>
                   </a:solidFill>
@@ -2440,7 +2444,7 @@
             </a:ln>
             <a:extLst>
               <a:ext uri="{91240B29-F687-4f45-9708-019B960494DF}">
-                <a14:hiddenLine xmlns="" xmlns:a14="http://schemas.microsoft.com/office/drawing/2010/main" w="9525">
+                <a14:hiddenLine xmlns:a14="http://schemas.microsoft.com/office/drawing/2010/main" xmlns="" w="9525">
                   <a:solidFill>
                     <a:srgbClr val="000000"/>
                   </a:solidFill>
@@ -2502,7 +2506,7 @@
             </a:ln>
             <a:extLst>
               <a:ext uri="{91240B29-F687-4f45-9708-019B960494DF}">
-                <a14:hiddenLine xmlns="" xmlns:a14="http://schemas.microsoft.com/office/drawing/2010/main" w="9525">
+                <a14:hiddenLine xmlns:a14="http://schemas.microsoft.com/office/drawing/2010/main" xmlns="" w="9525">
                   <a:solidFill>
                     <a:srgbClr val="000000"/>
                   </a:solidFill>
@@ -2564,7 +2568,7 @@
             </a:ln>
             <a:extLst>
               <a:ext uri="{91240B29-F687-4f45-9708-019B960494DF}">
-                <a14:hiddenLine xmlns="" xmlns:a14="http://schemas.microsoft.com/office/drawing/2010/main" w="9525">
+                <a14:hiddenLine xmlns:a14="http://schemas.microsoft.com/office/drawing/2010/main" xmlns="" w="9525">
                   <a:solidFill>
                     <a:srgbClr val="000000"/>
                   </a:solidFill>
@@ -2654,7 +2658,7 @@
             </a:ln>
             <a:extLst>
               <a:ext uri="{91240B29-F687-4f45-9708-019B960494DF}">
-                <a14:hiddenLine xmlns="" xmlns:a14="http://schemas.microsoft.com/office/drawing/2010/main" w="9525">
+                <a14:hiddenLine xmlns:a14="http://schemas.microsoft.com/office/drawing/2010/main" xmlns="" w="9525">
                   <a:solidFill>
                     <a:srgbClr val="000000"/>
                   </a:solidFill>
@@ -2722,7 +2726,7 @@
             </a:ln>
             <a:extLst>
               <a:ext uri="{91240B29-F687-4f45-9708-019B960494DF}">
-                <a14:hiddenLine xmlns="" xmlns:a14="http://schemas.microsoft.com/office/drawing/2010/main" w="9525">
+                <a14:hiddenLine xmlns:a14="http://schemas.microsoft.com/office/drawing/2010/main" xmlns="" w="9525">
                   <a:solidFill>
                     <a:srgbClr val="000000"/>
                   </a:solidFill>
@@ -2784,7 +2788,7 @@
             </a:ln>
             <a:extLst>
               <a:ext uri="{91240B29-F687-4f45-9708-019B960494DF}">
-                <a14:hiddenLine xmlns="" xmlns:a14="http://schemas.microsoft.com/office/drawing/2010/main" w="9525">
+                <a14:hiddenLine xmlns:a14="http://schemas.microsoft.com/office/drawing/2010/main" xmlns="" w="9525">
                   <a:solidFill>
                     <a:srgbClr val="000000"/>
                   </a:solidFill>
@@ -2874,7 +2878,7 @@
             </a:ln>
             <a:extLst>
               <a:ext uri="{91240B29-F687-4f45-9708-019B960494DF}">
-                <a14:hiddenLine xmlns="" xmlns:a14="http://schemas.microsoft.com/office/drawing/2010/main" w="9525">
+                <a14:hiddenLine xmlns:a14="http://schemas.microsoft.com/office/drawing/2010/main" xmlns="" w="9525">
                   <a:solidFill>
                     <a:srgbClr val="000000"/>
                   </a:solidFill>
@@ -2936,7 +2940,7 @@
             </a:ln>
             <a:extLst>
               <a:ext uri="{91240B29-F687-4f45-9708-019B960494DF}">
-                <a14:hiddenLine xmlns="" xmlns:a14="http://schemas.microsoft.com/office/drawing/2010/main" w="9525">
+                <a14:hiddenLine xmlns:a14="http://schemas.microsoft.com/office/drawing/2010/main" xmlns="" w="9525">
                   <a:solidFill>
                     <a:srgbClr val="000000"/>
                   </a:solidFill>
@@ -3026,7 +3030,7 @@
             </a:ln>
             <a:extLst>
               <a:ext uri="{91240B29-F687-4f45-9708-019B960494DF}">
-                <a14:hiddenLine xmlns="" xmlns:a14="http://schemas.microsoft.com/office/drawing/2010/main" w="9525">
+                <a14:hiddenLine xmlns:a14="http://schemas.microsoft.com/office/drawing/2010/main" xmlns="" w="9525">
                   <a:solidFill>
                     <a:srgbClr val="000000"/>
                   </a:solidFill>
@@ -3088,7 +3092,7 @@
             </a:ln>
             <a:extLst>
               <a:ext uri="{91240B29-F687-4f45-9708-019B960494DF}">
-                <a14:hiddenLine xmlns="" xmlns:a14="http://schemas.microsoft.com/office/drawing/2010/main" w="9525">
+                <a14:hiddenLine xmlns:a14="http://schemas.microsoft.com/office/drawing/2010/main" xmlns="" w="9525">
                   <a:solidFill>
                     <a:srgbClr val="000000"/>
                   </a:solidFill>
@@ -3178,7 +3182,7 @@
             </a:ln>
             <a:extLst>
               <a:ext uri="{91240B29-F687-4f45-9708-019B960494DF}">
-                <a14:hiddenLine xmlns="" xmlns:a14="http://schemas.microsoft.com/office/drawing/2010/main" w="9525">
+                <a14:hiddenLine xmlns:a14="http://schemas.microsoft.com/office/drawing/2010/main" xmlns="" w="9525">
                   <a:solidFill>
                     <a:srgbClr val="000000"/>
                   </a:solidFill>
@@ -3212,7 +3216,7 @@
             </a:ln>
             <a:extLst>
               <a:ext uri="{91240B29-F687-4f45-9708-019B960494DF}">
-                <a14:hiddenLine xmlns="" xmlns:a14="http://schemas.microsoft.com/office/drawing/2010/main" w="9525">
+                <a14:hiddenLine xmlns:a14="http://schemas.microsoft.com/office/drawing/2010/main" xmlns="" w="9525">
                   <a:solidFill>
                     <a:srgbClr val="000000"/>
                   </a:solidFill>
@@ -3277,7 +3281,7 @@
             </a:ln>
             <a:extLst>
               <a:ext uri="{91240B29-F687-4f45-9708-019B960494DF}">
-                <a14:hiddenLine xmlns="" xmlns:a14="http://schemas.microsoft.com/office/drawing/2010/main" w="9525">
+                <a14:hiddenLine xmlns:a14="http://schemas.microsoft.com/office/drawing/2010/main" xmlns="" w="9525">
                   <a:solidFill>
                     <a:srgbClr val="000000"/>
                   </a:solidFill>
@@ -3367,7 +3371,7 @@
             </a:ln>
             <a:extLst>
               <a:ext uri="{91240B29-F687-4f45-9708-019B960494DF}">
-                <a14:hiddenLine xmlns="" xmlns:a14="http://schemas.microsoft.com/office/drawing/2010/main" w="9525">
+                <a14:hiddenLine xmlns:a14="http://schemas.microsoft.com/office/drawing/2010/main" xmlns="" w="9525">
                   <a:solidFill>
                     <a:srgbClr val="000000"/>
                   </a:solidFill>
@@ -3429,7 +3433,7 @@
             </a:ln>
             <a:extLst>
               <a:ext uri="{91240B29-F687-4f45-9708-019B960494DF}">
-                <a14:hiddenLine xmlns="" xmlns:a14="http://schemas.microsoft.com/office/drawing/2010/main" w="9525">
+                <a14:hiddenLine xmlns:a14="http://schemas.microsoft.com/office/drawing/2010/main" xmlns="" w="9525">
                   <a:solidFill>
                     <a:srgbClr val="000000"/>
                   </a:solidFill>
@@ -3519,7 +3523,7 @@
             </a:ln>
             <a:extLst>
               <a:ext uri="{91240B29-F687-4f45-9708-019B960494DF}">
-                <a14:hiddenLine xmlns="" xmlns:a14="http://schemas.microsoft.com/office/drawing/2010/main" w="9525">
+                <a14:hiddenLine xmlns:a14="http://schemas.microsoft.com/office/drawing/2010/main" xmlns="" w="9525">
                   <a:solidFill>
                     <a:srgbClr val="000000"/>
                   </a:solidFill>
@@ -3609,7 +3613,7 @@
             </a:ln>
             <a:extLst>
               <a:ext uri="{91240B29-F687-4f45-9708-019B960494DF}">
-                <a14:hiddenLine xmlns="" xmlns:a14="http://schemas.microsoft.com/office/drawing/2010/main" w="9525">
+                <a14:hiddenLine xmlns:a14="http://schemas.microsoft.com/office/drawing/2010/main" xmlns="" w="9525">
                   <a:solidFill>
                     <a:srgbClr val="000000"/>
                   </a:solidFill>
@@ -3674,7 +3678,7 @@
             </a:ln>
             <a:extLst>
               <a:ext uri="{91240B29-F687-4f45-9708-019B960494DF}">
-                <a14:hiddenLine xmlns="" xmlns:a14="http://schemas.microsoft.com/office/drawing/2010/main" w="9525">
+                <a14:hiddenLine xmlns:a14="http://schemas.microsoft.com/office/drawing/2010/main" xmlns="" w="9525">
                   <a:solidFill>
                     <a:srgbClr val="000000"/>
                   </a:solidFill>
@@ -3736,7 +3740,7 @@
             </a:ln>
             <a:extLst>
               <a:ext uri="{91240B29-F687-4f45-9708-019B960494DF}">
-                <a14:hiddenLine xmlns="" xmlns:a14="http://schemas.microsoft.com/office/drawing/2010/main" w="9525">
+                <a14:hiddenLine xmlns:a14="http://schemas.microsoft.com/office/drawing/2010/main" xmlns="" w="9525">
                   <a:solidFill>
                     <a:srgbClr val="000000"/>
                   </a:solidFill>
@@ -3826,7 +3830,7 @@
             </a:ln>
             <a:extLst>
               <a:ext uri="{91240B29-F687-4f45-9708-019B960494DF}">
-                <a14:hiddenLine xmlns="" xmlns:a14="http://schemas.microsoft.com/office/drawing/2010/main" w="9525">
+                <a14:hiddenLine xmlns:a14="http://schemas.microsoft.com/office/drawing/2010/main" xmlns="" w="9525">
                   <a:solidFill>
                     <a:srgbClr val="000000"/>
                   </a:solidFill>
@@ -3916,7 +3920,7 @@
             </a:ln>
             <a:extLst>
               <a:ext uri="{91240B29-F687-4f45-9708-019B960494DF}">
-                <a14:hiddenLine xmlns="" xmlns:a14="http://schemas.microsoft.com/office/drawing/2010/main" w="9525">
+                <a14:hiddenLine xmlns:a14="http://schemas.microsoft.com/office/drawing/2010/main" xmlns="" w="9525">
                   <a:solidFill>
                     <a:srgbClr val="000000"/>
                   </a:solidFill>
@@ -3978,7 +3982,7 @@
             </a:ln>
             <a:extLst>
               <a:ext uri="{91240B29-F687-4f45-9708-019B960494DF}">
-                <a14:hiddenLine xmlns="" xmlns:a14="http://schemas.microsoft.com/office/drawing/2010/main" w="9525">
+                <a14:hiddenLine xmlns:a14="http://schemas.microsoft.com/office/drawing/2010/main" xmlns="" w="9525">
                   <a:solidFill>
                     <a:srgbClr val="000000"/>
                   </a:solidFill>
@@ -4098,7 +4102,7 @@
             </a:ln>
             <a:extLst>
               <a:ext uri="{91240B29-F687-4f45-9708-019B960494DF}">
-                <a14:hiddenLine xmlns="" xmlns:a14="http://schemas.microsoft.com/office/drawing/2010/main" w="9525">
+                <a14:hiddenLine xmlns:a14="http://schemas.microsoft.com/office/drawing/2010/main" xmlns="" w="9525">
                   <a:solidFill>
                     <a:srgbClr val="000000"/>
                   </a:solidFill>
@@ -4166,7 +4170,7 @@
             </a:ln>
             <a:extLst>
               <a:ext uri="{91240B29-F687-4f45-9708-019B960494DF}">
-                <a14:hiddenLine xmlns="" xmlns:a14="http://schemas.microsoft.com/office/drawing/2010/main" w="9525">
+                <a14:hiddenLine xmlns:a14="http://schemas.microsoft.com/office/drawing/2010/main" xmlns="" w="9525">
                   <a:solidFill>
                     <a:srgbClr val="000000"/>
                   </a:solidFill>
@@ -4256,7 +4260,7 @@
             </a:ln>
             <a:extLst>
               <a:ext uri="{91240B29-F687-4f45-9708-019B960494DF}">
-                <a14:hiddenLine xmlns="" xmlns:a14="http://schemas.microsoft.com/office/drawing/2010/main" w="9525">
+                <a14:hiddenLine xmlns:a14="http://schemas.microsoft.com/office/drawing/2010/main" xmlns="" w="9525">
                   <a:solidFill>
                     <a:srgbClr val="000000"/>
                   </a:solidFill>
@@ -8978,7 +8982,7 @@
           <a:noFill/>
           <a:extLst>
             <a:ext uri="{909E8E84-426E-40dd-AFC4-6F175D3DCCD1}">
-              <a14:hiddenFill xmlns="" xmlns:a14="http://schemas.microsoft.com/office/drawing/2010/main">
+              <a14:hiddenFill xmlns:a14="http://schemas.microsoft.com/office/drawing/2010/main" xmlns="">
                 <a:solidFill>
                   <a:srgbClr val="FFFFFF"/>
                 </a:solidFill>
@@ -9052,7 +9056,7 @@
               </a:ln>
               <a:extLst>
                 <a:ext uri="{91240B29-F687-4f45-9708-019B960494DF}">
-                  <a14:hiddenLine xmlns="" xmlns:a14="http://schemas.microsoft.com/office/drawing/2010/main" w="9525">
+                  <a14:hiddenLine xmlns:a14="http://schemas.microsoft.com/office/drawing/2010/main" xmlns="" w="9525">
                     <a:solidFill>
                       <a:srgbClr val="000000"/>
                     </a:solidFill>
@@ -9142,7 +9146,7 @@
               </a:ln>
               <a:extLst>
                 <a:ext uri="{91240B29-F687-4f45-9708-019B960494DF}">
-                  <a14:hiddenLine xmlns="" xmlns:a14="http://schemas.microsoft.com/office/drawing/2010/main" w="9525">
+                  <a14:hiddenLine xmlns:a14="http://schemas.microsoft.com/office/drawing/2010/main" xmlns="" w="9525">
                     <a:solidFill>
                       <a:srgbClr val="000000"/>
                     </a:solidFill>
@@ -9232,7 +9236,7 @@
               </a:ln>
               <a:extLst>
                 <a:ext uri="{91240B29-F687-4f45-9708-019B960494DF}">
-                  <a14:hiddenLine xmlns="" xmlns:a14="http://schemas.microsoft.com/office/drawing/2010/main" w="9525">
+                  <a14:hiddenLine xmlns:a14="http://schemas.microsoft.com/office/drawing/2010/main" xmlns="" w="9525">
                     <a:solidFill>
                       <a:srgbClr val="000000"/>
                     </a:solidFill>
@@ -9294,7 +9298,7 @@
               </a:ln>
               <a:extLst>
                 <a:ext uri="{91240B29-F687-4f45-9708-019B960494DF}">
-                  <a14:hiddenLine xmlns="" xmlns:a14="http://schemas.microsoft.com/office/drawing/2010/main" w="9525">
+                  <a14:hiddenLine xmlns:a14="http://schemas.microsoft.com/office/drawing/2010/main" xmlns="" w="9525">
                     <a:solidFill>
                       <a:srgbClr val="000000"/>
                     </a:solidFill>
@@ -9384,7 +9388,7 @@
               </a:ln>
               <a:extLst>
                 <a:ext uri="{91240B29-F687-4f45-9708-019B960494DF}">
-                  <a14:hiddenLine xmlns="" xmlns:a14="http://schemas.microsoft.com/office/drawing/2010/main" w="9525">
+                  <a14:hiddenLine xmlns:a14="http://schemas.microsoft.com/office/drawing/2010/main" xmlns="" w="9525">
                     <a:solidFill>
                       <a:srgbClr val="000000"/>
                     </a:solidFill>
@@ -9446,7 +9450,7 @@
               </a:ln>
               <a:extLst>
                 <a:ext uri="{91240B29-F687-4f45-9708-019B960494DF}">
-                  <a14:hiddenLine xmlns="" xmlns:a14="http://schemas.microsoft.com/office/drawing/2010/main" w="9525">
+                  <a14:hiddenLine xmlns:a14="http://schemas.microsoft.com/office/drawing/2010/main" xmlns="" w="9525">
                     <a:solidFill>
                       <a:srgbClr val="000000"/>
                     </a:solidFill>
@@ -9508,7 +9512,7 @@
               </a:ln>
               <a:extLst>
                 <a:ext uri="{91240B29-F687-4f45-9708-019B960494DF}">
-                  <a14:hiddenLine xmlns="" xmlns:a14="http://schemas.microsoft.com/office/drawing/2010/main" w="9525">
+                  <a14:hiddenLine xmlns:a14="http://schemas.microsoft.com/office/drawing/2010/main" xmlns="" w="9525">
                     <a:solidFill>
                       <a:srgbClr val="000000"/>
                     </a:solidFill>
@@ -9598,7 +9602,7 @@
               </a:ln>
               <a:extLst>
                 <a:ext uri="{91240B29-F687-4f45-9708-019B960494DF}">
-                  <a14:hiddenLine xmlns="" xmlns:a14="http://schemas.microsoft.com/office/drawing/2010/main" w="9525">
+                  <a14:hiddenLine xmlns:a14="http://schemas.microsoft.com/office/drawing/2010/main" xmlns="" w="9525">
                     <a:solidFill>
                       <a:srgbClr val="000000"/>
                     </a:solidFill>
@@ -9688,7 +9692,7 @@
               </a:ln>
               <a:extLst>
                 <a:ext uri="{91240B29-F687-4f45-9708-019B960494DF}">
-                  <a14:hiddenLine xmlns="" xmlns:a14="http://schemas.microsoft.com/office/drawing/2010/main" w="9525">
+                  <a14:hiddenLine xmlns:a14="http://schemas.microsoft.com/office/drawing/2010/main" xmlns="" w="9525">
                     <a:solidFill>
                       <a:srgbClr val="000000"/>
                     </a:solidFill>
@@ -9750,7 +9754,7 @@
               </a:ln>
               <a:extLst>
                 <a:ext uri="{91240B29-F687-4f45-9708-019B960494DF}">
-                  <a14:hiddenLine xmlns="" xmlns:a14="http://schemas.microsoft.com/office/drawing/2010/main" w="9525">
+                  <a14:hiddenLine xmlns:a14="http://schemas.microsoft.com/office/drawing/2010/main" xmlns="" w="9525">
                     <a:solidFill>
                       <a:srgbClr val="000000"/>
                     </a:solidFill>
@@ -9860,7 +9864,7 @@
               </a:ln>
               <a:extLst>
                 <a:ext uri="{91240B29-F687-4f45-9708-019B960494DF}">
-                  <a14:hiddenLine xmlns="" xmlns:a14="http://schemas.microsoft.com/office/drawing/2010/main" w="9525">
+                  <a14:hiddenLine xmlns:a14="http://schemas.microsoft.com/office/drawing/2010/main" xmlns="" w="9525">
                     <a:solidFill>
                       <a:srgbClr val="000000"/>
                     </a:solidFill>
@@ -9944,7 +9948,7 @@
               </a:ln>
               <a:extLst>
                 <a:ext uri="{91240B29-F687-4f45-9708-019B960494DF}">
-                  <a14:hiddenLine xmlns="" xmlns:a14="http://schemas.microsoft.com/office/drawing/2010/main" w="9525">
+                  <a14:hiddenLine xmlns:a14="http://schemas.microsoft.com/office/drawing/2010/main" xmlns="" w="9525">
                     <a:solidFill>
                       <a:srgbClr val="000000"/>
                     </a:solidFill>
@@ -10006,7 +10010,7 @@
               </a:ln>
               <a:extLst>
                 <a:ext uri="{91240B29-F687-4f45-9708-019B960494DF}">
-                  <a14:hiddenLine xmlns="" xmlns:a14="http://schemas.microsoft.com/office/drawing/2010/main" w="9525">
+                  <a14:hiddenLine xmlns:a14="http://schemas.microsoft.com/office/drawing/2010/main" xmlns="" w="9525">
                     <a:solidFill>
                       <a:srgbClr val="000000"/>
                     </a:solidFill>
@@ -10068,7 +10072,7 @@
               </a:ln>
               <a:extLst>
                 <a:ext uri="{91240B29-F687-4f45-9708-019B960494DF}">
-                  <a14:hiddenLine xmlns="" xmlns:a14="http://schemas.microsoft.com/office/drawing/2010/main" w="9525">
+                  <a14:hiddenLine xmlns:a14="http://schemas.microsoft.com/office/drawing/2010/main" xmlns="" w="9525">
                     <a:solidFill>
                       <a:srgbClr val="000000"/>
                     </a:solidFill>
@@ -10158,7 +10162,7 @@
               </a:ln>
               <a:extLst>
                 <a:ext uri="{91240B29-F687-4f45-9708-019B960494DF}">
-                  <a14:hiddenLine xmlns="" xmlns:a14="http://schemas.microsoft.com/office/drawing/2010/main" w="9525">
+                  <a14:hiddenLine xmlns:a14="http://schemas.microsoft.com/office/drawing/2010/main" xmlns="" w="9525">
                     <a:solidFill>
                       <a:srgbClr val="000000"/>
                     </a:solidFill>
@@ -10192,7 +10196,7 @@
               </a:ln>
               <a:extLst>
                 <a:ext uri="{91240B29-F687-4f45-9708-019B960494DF}">
-                  <a14:hiddenLine xmlns="" xmlns:a14="http://schemas.microsoft.com/office/drawing/2010/main" w="9525">
+                  <a14:hiddenLine xmlns:a14="http://schemas.microsoft.com/office/drawing/2010/main" xmlns="" w="9525">
                     <a:solidFill>
                       <a:srgbClr val="000000"/>
                     </a:solidFill>
@@ -10257,7 +10261,7 @@
               </a:ln>
               <a:extLst>
                 <a:ext uri="{91240B29-F687-4f45-9708-019B960494DF}">
-                  <a14:hiddenLine xmlns="" xmlns:a14="http://schemas.microsoft.com/office/drawing/2010/main" w="9525">
+                  <a14:hiddenLine xmlns:a14="http://schemas.microsoft.com/office/drawing/2010/main" xmlns="" w="9525">
                     <a:solidFill>
                       <a:srgbClr val="000000"/>
                     </a:solidFill>
@@ -10347,7 +10351,7 @@
               </a:ln>
               <a:extLst>
                 <a:ext uri="{91240B29-F687-4f45-9708-019B960494DF}">
-                  <a14:hiddenLine xmlns="" xmlns:a14="http://schemas.microsoft.com/office/drawing/2010/main" w="9525">
+                  <a14:hiddenLine xmlns:a14="http://schemas.microsoft.com/office/drawing/2010/main" xmlns="" w="9525">
                     <a:solidFill>
                       <a:srgbClr val="000000"/>
                     </a:solidFill>
@@ -10409,7 +10413,7 @@
               </a:ln>
               <a:extLst>
                 <a:ext uri="{91240B29-F687-4f45-9708-019B960494DF}">
-                  <a14:hiddenLine xmlns="" xmlns:a14="http://schemas.microsoft.com/office/drawing/2010/main" w="9525">
+                  <a14:hiddenLine xmlns:a14="http://schemas.microsoft.com/office/drawing/2010/main" xmlns="" w="9525">
                     <a:solidFill>
                       <a:srgbClr val="000000"/>
                     </a:solidFill>
@@ -10499,7 +10503,7 @@
               </a:ln>
               <a:extLst>
                 <a:ext uri="{91240B29-F687-4f45-9708-019B960494DF}">
-                  <a14:hiddenLine xmlns="" xmlns:a14="http://schemas.microsoft.com/office/drawing/2010/main" w="9525">
+                  <a14:hiddenLine xmlns:a14="http://schemas.microsoft.com/office/drawing/2010/main" xmlns="" w="9525">
                     <a:solidFill>
                       <a:srgbClr val="000000"/>
                     </a:solidFill>
@@ -10564,7 +10568,7 @@
               </a:ln>
               <a:extLst>
                 <a:ext uri="{91240B29-F687-4f45-9708-019B960494DF}">
-                  <a14:hiddenLine xmlns="" xmlns:a14="http://schemas.microsoft.com/office/drawing/2010/main" w="9525">
+                  <a14:hiddenLine xmlns:a14="http://schemas.microsoft.com/office/drawing/2010/main" xmlns="" w="9525">
                     <a:solidFill>
                       <a:srgbClr val="000000"/>
                     </a:solidFill>
@@ -10626,7 +10630,7 @@
               </a:ln>
               <a:extLst>
                 <a:ext uri="{91240B29-F687-4f45-9708-019B960494DF}">
-                  <a14:hiddenLine xmlns="" xmlns:a14="http://schemas.microsoft.com/office/drawing/2010/main" w="9525">
+                  <a14:hiddenLine xmlns:a14="http://schemas.microsoft.com/office/drawing/2010/main" xmlns="" w="9525">
                     <a:solidFill>
                       <a:srgbClr val="000000"/>
                     </a:solidFill>
@@ -10716,7 +10720,7 @@
               </a:ln>
               <a:extLst>
                 <a:ext uri="{91240B29-F687-4f45-9708-019B960494DF}">
-                  <a14:hiddenLine xmlns="" xmlns:a14="http://schemas.microsoft.com/office/drawing/2010/main" w="9525">
+                  <a14:hiddenLine xmlns:a14="http://schemas.microsoft.com/office/drawing/2010/main" xmlns="" w="9525">
                     <a:solidFill>
                       <a:srgbClr val="000000"/>
                     </a:solidFill>
@@ -10806,7 +10810,7 @@
               </a:ln>
               <a:extLst>
                 <a:ext uri="{91240B29-F687-4f45-9708-019B960494DF}">
-                  <a14:hiddenLine xmlns="" xmlns:a14="http://schemas.microsoft.com/office/drawing/2010/main" w="9525">
+                  <a14:hiddenLine xmlns:a14="http://schemas.microsoft.com/office/drawing/2010/main" xmlns="" w="9525">
                     <a:solidFill>
                       <a:srgbClr val="000000"/>
                     </a:solidFill>
@@ -10871,7 +10875,7 @@
               </a:ln>
               <a:extLst>
                 <a:ext uri="{91240B29-F687-4f45-9708-019B960494DF}">
-                  <a14:hiddenLine xmlns="" xmlns:a14="http://schemas.microsoft.com/office/drawing/2010/main" w="9525">
+                  <a14:hiddenLine xmlns:a14="http://schemas.microsoft.com/office/drawing/2010/main" xmlns="" w="9525">
                     <a:solidFill>
                       <a:srgbClr val="000000"/>
                     </a:solidFill>
@@ -10991,7 +10995,7 @@
               </a:ln>
               <a:extLst>
                 <a:ext uri="{91240B29-F687-4f45-9708-019B960494DF}">
-                  <a14:hiddenLine xmlns="" xmlns:a14="http://schemas.microsoft.com/office/drawing/2010/main" w="9525">
+                  <a14:hiddenLine xmlns:a14="http://schemas.microsoft.com/office/drawing/2010/main" xmlns="" w="9525">
                     <a:solidFill>
                       <a:srgbClr val="000000"/>
                     </a:solidFill>
@@ -11089,7 +11093,7 @@
               </a:ln>
               <a:extLst>
                 <a:ext uri="{91240B29-F687-4f45-9708-019B960494DF}">
-                  <a14:hiddenLine xmlns="" xmlns:a14="http://schemas.microsoft.com/office/drawing/2010/main" w="9525">
+                  <a14:hiddenLine xmlns:a14="http://schemas.microsoft.com/office/drawing/2010/main" xmlns="" w="9525">
                     <a:solidFill>
                       <a:srgbClr val="000000"/>
                     </a:solidFill>
@@ -11204,7 +11208,7 @@
               </a:ln>
               <a:extLst>
                 <a:ext uri="{91240B29-F687-4f45-9708-019B960494DF}">
-                  <a14:hiddenLine xmlns="" xmlns:a14="http://schemas.microsoft.com/office/drawing/2010/main" w="9525">
+                  <a14:hiddenLine xmlns:a14="http://schemas.microsoft.com/office/drawing/2010/main" xmlns="" w="9525">
                     <a:solidFill>
                       <a:srgbClr val="000000"/>
                     </a:solidFill>
@@ -11294,7 +11298,7 @@
               </a:ln>
               <a:extLst>
                 <a:ext uri="{91240B29-F687-4f45-9708-019B960494DF}">
-                  <a14:hiddenLine xmlns="" xmlns:a14="http://schemas.microsoft.com/office/drawing/2010/main" w="9525">
+                  <a14:hiddenLine xmlns:a14="http://schemas.microsoft.com/office/drawing/2010/main" xmlns="" w="9525">
                     <a:solidFill>
                       <a:srgbClr val="000000"/>
                     </a:solidFill>
@@ -11359,7 +11363,7 @@
               </a:ln>
               <a:extLst>
                 <a:ext uri="{91240B29-F687-4f45-9708-019B960494DF}">
-                  <a14:hiddenLine xmlns="" xmlns:a14="http://schemas.microsoft.com/office/drawing/2010/main" w="9525">
+                  <a14:hiddenLine xmlns:a14="http://schemas.microsoft.com/office/drawing/2010/main" xmlns="" w="9525">
                     <a:solidFill>
                       <a:srgbClr val="000000"/>
                     </a:solidFill>
@@ -11449,7 +11453,7 @@
               </a:ln>
               <a:extLst>
                 <a:ext uri="{91240B29-F687-4f45-9708-019B960494DF}">
-                  <a14:hiddenLine xmlns="" xmlns:a14="http://schemas.microsoft.com/office/drawing/2010/main" w="9525">
+                  <a14:hiddenLine xmlns:a14="http://schemas.microsoft.com/office/drawing/2010/main" xmlns="" w="9525">
                     <a:solidFill>
                       <a:srgbClr val="000000"/>
                     </a:solidFill>
@@ -11517,7 +11521,7 @@
               </a:ln>
               <a:extLst>
                 <a:ext uri="{91240B29-F687-4f45-9708-019B960494DF}">
-                  <a14:hiddenLine xmlns="" xmlns:a14="http://schemas.microsoft.com/office/drawing/2010/main" w="9525">
+                  <a14:hiddenLine xmlns:a14="http://schemas.microsoft.com/office/drawing/2010/main" xmlns="" w="9525">
                     <a:solidFill>
                       <a:srgbClr val="000000"/>
                     </a:solidFill>
@@ -11607,7 +11611,7 @@
               </a:ln>
               <a:extLst>
                 <a:ext uri="{91240B29-F687-4f45-9708-019B960494DF}">
-                  <a14:hiddenLine xmlns="" xmlns:a14="http://schemas.microsoft.com/office/drawing/2010/main" w="9525">
+                  <a14:hiddenLine xmlns:a14="http://schemas.microsoft.com/office/drawing/2010/main" xmlns="" w="9525">
                     <a:solidFill>
                       <a:srgbClr val="000000"/>
                     </a:solidFill>
@@ -11675,7 +11679,7 @@
               </a:ln>
               <a:extLst>
                 <a:ext uri="{91240B29-F687-4f45-9708-019B960494DF}">
-                  <a14:hiddenLine xmlns="" xmlns:a14="http://schemas.microsoft.com/office/drawing/2010/main" w="9525">
+                  <a14:hiddenLine xmlns:a14="http://schemas.microsoft.com/office/drawing/2010/main" xmlns="" w="9525">
                     <a:solidFill>
                       <a:srgbClr val="000000"/>
                     </a:solidFill>
@@ -11765,7 +11769,7 @@
               </a:ln>
               <a:extLst>
                 <a:ext uri="{91240B29-F687-4f45-9708-019B960494DF}">
-                  <a14:hiddenLine xmlns="" xmlns:a14="http://schemas.microsoft.com/office/drawing/2010/main" w="9525">
+                  <a14:hiddenLine xmlns:a14="http://schemas.microsoft.com/office/drawing/2010/main" xmlns="" w="9525">
                     <a:solidFill>
                       <a:srgbClr val="000000"/>
                     </a:solidFill>
@@ -11799,7 +11803,7 @@
               </a:ln>
               <a:extLst>
                 <a:ext uri="{91240B29-F687-4f45-9708-019B960494DF}">
-                  <a14:hiddenLine xmlns="" xmlns:a14="http://schemas.microsoft.com/office/drawing/2010/main" w="9525">
+                  <a14:hiddenLine xmlns:a14="http://schemas.microsoft.com/office/drawing/2010/main" xmlns="" w="9525">
                     <a:solidFill>
                       <a:srgbClr val="000000"/>
                     </a:solidFill>
@@ -13902,15 +13906,7 @@
           <a:p>
             <a:r>
               <a:rPr lang="de-CH" dirty="0" err="1"/>
-              <a:t>What</a:t>
-            </a:r>
-            <a:r>
-              <a:rPr lang="de-CH" dirty="0"/>
-              <a:t> was </a:t>
-            </a:r>
-            <a:r>
-              <a:rPr lang="de-CH" dirty="0" err="1"/>
-              <a:t>one</a:t>
+              <a:t>How</a:t>
             </a:r>
             <a:r>
               <a:rPr lang="de-CH" dirty="0"/>
@@ -13918,7 +13914,7 @@
             </a:r>
             <a:r>
               <a:rPr lang="de-CH" dirty="0" err="1"/>
-              <a:t>of</a:t>
+              <a:t>is</a:t>
             </a:r>
             <a:r>
               <a:rPr lang="de-CH" dirty="0"/>
@@ -13934,7 +13930,7 @@
             </a:r>
             <a:r>
               <a:rPr lang="de-CH" dirty="0" err="1"/>
-              <a:t>topics</a:t>
+              <a:t>project</a:t>
             </a:r>
             <a:r>
               <a:rPr lang="de-CH" dirty="0"/>
@@ -13942,15 +13938,23 @@
             </a:r>
             <a:r>
               <a:rPr lang="de-CH" dirty="0" err="1"/>
-              <a:t>from</a:t>
+              <a:t>structure</a:t>
             </a:r>
             <a:r>
               <a:rPr lang="de-CH" dirty="0"/>
-              <a:t> last </a:t>
+              <a:t>  </a:t>
             </a:r>
             <a:r>
               <a:rPr lang="de-CH" dirty="0" err="1"/>
-              <a:t>week's</a:t>
+              <a:t>of</a:t>
+            </a:r>
+            <a:r>
+              <a:rPr lang="de-CH" dirty="0"/>
+              <a:t> Mr. </a:t>
+            </a:r>
+            <a:r>
+              <a:rPr lang="de-CH" dirty="0" err="1"/>
+              <a:t>Stygers</a:t>
             </a:r>
             <a:r>
               <a:rPr lang="de-CH" dirty="0"/>
@@ -13958,7 +13962,23 @@
             </a:r>
             <a:r>
               <a:rPr lang="de-CH" dirty="0" err="1"/>
-              <a:t>recap</a:t>
+              <a:t>default</a:t>
+            </a:r>
+            <a:r>
+              <a:rPr lang="de-CH" dirty="0"/>
+              <a:t> </a:t>
+            </a:r>
+            <a:r>
+              <a:rPr lang="de-CH" dirty="0" err="1"/>
+              <a:t>project</a:t>
+            </a:r>
+            <a:r>
+              <a:rPr lang="de-CH" dirty="0"/>
+              <a:t> </a:t>
+            </a:r>
+            <a:r>
+              <a:rPr lang="de-CH" dirty="0" err="1"/>
+              <a:t>organized</a:t>
             </a:r>
             <a:r>
               <a:rPr lang="de-CH" dirty="0"/>
@@ -13971,8 +13991,12 @@
               <a:buChar char="-"/>
             </a:pPr>
             <a:r>
+              <a:rPr lang="de-CH" dirty="0"/>
+              <a:t>Real </a:t>
+            </a:r>
+            <a:r>
               <a:rPr lang="de-CH" dirty="0" err="1"/>
-              <a:t>Inheritance</a:t>
+              <a:t>library</a:t>
             </a:r>
             <a:endParaRPr lang="de-CH" dirty="0"/>
           </a:p>
@@ -13982,13 +14006,14 @@
               <a:buChar char="-"/>
             </a:pPr>
             <a:r>
+              <a:rPr lang="de-CH" dirty="0"/>
+              <a:t>Folder outside </a:t>
+            </a:r>
+            <a:r>
               <a:rPr lang="de-CH" dirty="0" err="1"/>
-              <a:t>Processor</a:t>
-            </a:r>
-            <a:r>
-              <a:rPr lang="de-CH" dirty="0"/>
-              <a:t> Expert</a:t>
-            </a:r>
+              <a:t>project</a:t>
+            </a:r>
+            <a:endParaRPr lang="de-CH" dirty="0"/>
           </a:p>
           <a:p>
             <a:pPr lvl="1">
@@ -13996,8 +14021,12 @@
               <a:buChar char="-"/>
             </a:pPr>
             <a:r>
+              <a:rPr lang="de-CH" dirty="0"/>
+              <a:t>Folder </a:t>
+            </a:r>
+            <a:r>
               <a:rPr lang="de-CH" dirty="0" err="1"/>
-              <a:t>nonviolent</a:t>
+              <a:t>inside</a:t>
             </a:r>
             <a:r>
               <a:rPr lang="de-CH" dirty="0"/>
@@ -14005,9 +14034,20 @@
             </a:r>
             <a:r>
               <a:rPr lang="de-CH" dirty="0" err="1"/>
-              <a:t>communications</a:t>
-            </a:r>
-            <a:endParaRPr lang="de-CH" dirty="0"/>
+              <a:t>project</a:t>
+            </a:r>
+            <a:r>
+              <a:rPr lang="de-CH" dirty="0"/>
+              <a:t> (</a:t>
+            </a:r>
+            <a:r>
+              <a:rPr lang="de-CH" dirty="0" err="1"/>
+              <a:t>with</a:t>
+            </a:r>
+            <a:r>
+              <a:rPr lang="de-CH" dirty="0"/>
+              <a:t> relative link)</a:t>
+            </a:r>
           </a:p>
           <a:p>
             <a:pPr lvl="1">
@@ -14016,7 +14056,31 @@
             </a:pPr>
             <a:r>
               <a:rPr lang="de-CH" dirty="0"/>
-              <a:t>Version Control System</a:t>
+              <a:t>Folder </a:t>
+            </a:r>
+            <a:r>
+              <a:rPr lang="de-CH" dirty="0" err="1"/>
+              <a:t>inside</a:t>
+            </a:r>
+            <a:r>
+              <a:rPr lang="de-CH" dirty="0"/>
+              <a:t> </a:t>
+            </a:r>
+            <a:r>
+              <a:rPr lang="de-CH" dirty="0" err="1"/>
+              <a:t>project</a:t>
+            </a:r>
+            <a:r>
+              <a:rPr lang="de-CH" dirty="0"/>
+              <a:t> (</a:t>
+            </a:r>
+            <a:r>
+              <a:rPr lang="de-CH" dirty="0" err="1"/>
+              <a:t>with</a:t>
+            </a:r>
+            <a:r>
+              <a:rPr lang="de-CH" dirty="0"/>
+              <a:t> absolute link)</a:t>
             </a:r>
           </a:p>
           <a:p>
@@ -14026,11 +14090,11 @@
             </a:pPr>
             <a:r>
               <a:rPr lang="de-CH" dirty="0"/>
-              <a:t>Project </a:t>
-            </a:r>
-            <a:r>
-              <a:rPr lang="de-CH" dirty="0" err="1"/>
-              <a:t>Structure</a:t>
+              <a:t>Virtual </a:t>
+            </a:r>
+            <a:r>
+              <a:rPr lang="de-CH"/>
+              <a:t>folder</a:t>
             </a:r>
             <a:endParaRPr lang="de-CH" dirty="0"/>
           </a:p>

</xml_diff>